<commit_message>
power point iteration 3
</commit_message>
<xml_diff>
--- a/Présentation TLJ ité 3.pptx
+++ b/Présentation TLJ ité 3.pptx
@@ -4291,7 +4291,7 @@
             <a:avLst/>
           </a:prstGeom>
           <a:solidFill>
-            <a:srgbClr val="00B050"/>
+            <a:srgbClr val="FFFF00"/>
           </a:solidFill>
         </p:spPr>
         <p:style>
@@ -4332,7 +4332,7 @@
             <a:avLst/>
           </a:prstGeom>
           <a:solidFill>
-            <a:srgbClr val="00B050"/>
+            <a:srgbClr val="FFFF00"/>
           </a:solidFill>
         </p:spPr>
         <p:style>
@@ -4373,7 +4373,7 @@
             <a:avLst/>
           </a:prstGeom>
           <a:solidFill>
-            <a:srgbClr val="00B050"/>
+            <a:srgbClr val="FF0000"/>
           </a:solidFill>
         </p:spPr>
         <p:style>

</xml_diff>